<commit_message>
PPT hozzaadasa és kicsi pkt modositas
</commit_message>
<xml_diff>
--- a/2-3-Projektmunka.pptx
+++ b/2-3-Projektmunka.pptx
@@ -8,6 +8,12 @@
     <p:sldId id="256" r:id="rId2"/>
     <p:sldId id="257" r:id="rId3"/>
     <p:sldId id="258" r:id="rId4"/>
+    <p:sldId id="263" r:id="rId5"/>
+    <p:sldId id="259" r:id="rId6"/>
+    <p:sldId id="262" r:id="rId7"/>
+    <p:sldId id="260" r:id="rId8"/>
+    <p:sldId id="261" r:id="rId9"/>
+    <p:sldId id="264" r:id="rId10"/>
   </p:sldIdLst>
   <p:sldSz cx="12192000" cy="6858000"/>
   <p:notesSz cx="6858000" cy="9144000"/>
@@ -106,6 +112,11 @@
       </a:defRPr>
     </a:lvl9pPr>
   </p:defaultTextStyle>
+  <p:extLst>
+    <p:ext uri="{EFAFB233-063F-42B5-8137-9DF3F51BA10A}">
+      <p15:sldGuideLst xmlns:p15="http://schemas.microsoft.com/office/powerpoint/2012/main"/>
+    </p:ext>
+  </p:extLst>
 </p:presentation>
 </file>
 
@@ -3539,10 +3550,10 @@
       </p:grpSpPr>
       <p:pic>
         <p:nvPicPr>
-          <p:cNvPr id="5" name="Kép 4">
-            <a:extLst>
-              <a:ext uri="{FF2B5EF4-FFF2-40B4-BE49-F238E27FC236}">
-                <a16:creationId xmlns:a16="http://schemas.microsoft.com/office/drawing/2014/main" id="{AE2C9FE4-CFEF-41A6-899A-8B4452B5FE4E}"/>
+          <p:cNvPr id="3" name="Kép 2">
+            <a:extLst>
+              <a:ext uri="{FF2B5EF4-FFF2-40B4-BE49-F238E27FC236}">
+                <a16:creationId xmlns:a16="http://schemas.microsoft.com/office/drawing/2014/main" id="{F682AB24-C4AC-41E1-902A-3A2C00D6E4FA}"/>
               </a:ext>
             </a:extLst>
           </p:cNvPr>
@@ -3559,8 +3570,8 @@
         </p:blipFill>
         <p:spPr>
           <a:xfrm>
-            <a:off x="397322" y="205944"/>
-            <a:ext cx="5319226" cy="4197381"/>
+            <a:off x="233424" y="341781"/>
+            <a:ext cx="3509957" cy="3662048"/>
           </a:xfrm>
           <a:prstGeom prst="rect">
             <a:avLst/>
@@ -3569,10 +3580,10 @@
       </p:pic>
       <p:pic>
         <p:nvPicPr>
-          <p:cNvPr id="7" name="Kép 6">
-            <a:extLst>
-              <a:ext uri="{FF2B5EF4-FFF2-40B4-BE49-F238E27FC236}">
-                <a16:creationId xmlns:a16="http://schemas.microsoft.com/office/drawing/2014/main" id="{D88BB358-E381-4DC5-B0C4-BA09B3651F2D}"/>
+          <p:cNvPr id="6" name="Kép 5">
+            <a:extLst>
+              <a:ext uri="{FF2B5EF4-FFF2-40B4-BE49-F238E27FC236}">
+                <a16:creationId xmlns:a16="http://schemas.microsoft.com/office/drawing/2014/main" id="{B3B7C4B1-A7C7-4097-A388-A08ACBA932EE}"/>
               </a:ext>
             </a:extLst>
           </p:cNvPr>
@@ -3589,8 +3600,8 @@
         </p:blipFill>
         <p:spPr>
           <a:xfrm>
-            <a:off x="5841507" y="205944"/>
-            <a:ext cx="6112969" cy="4276455"/>
+            <a:off x="7938958" y="341781"/>
+            <a:ext cx="3944455" cy="3662048"/>
           </a:xfrm>
           <a:prstGeom prst="rect">
             <a:avLst/>
@@ -3599,10 +3610,10 @@
       </p:pic>
       <p:pic>
         <p:nvPicPr>
-          <p:cNvPr id="9" name="Kép 8">
-            <a:extLst>
-              <a:ext uri="{FF2B5EF4-FFF2-40B4-BE49-F238E27FC236}">
-                <a16:creationId xmlns:a16="http://schemas.microsoft.com/office/drawing/2014/main" id="{FC89CF59-1602-44BA-AB07-2556FC0877DE}"/>
+          <p:cNvPr id="10" name="Kép 9">
+            <a:extLst>
+              <a:ext uri="{FF2B5EF4-FFF2-40B4-BE49-F238E27FC236}">
+                <a16:creationId xmlns:a16="http://schemas.microsoft.com/office/drawing/2014/main" id="{9FF585FF-48C0-4C0B-B0D6-F6F7F83F0774}"/>
               </a:ext>
             </a:extLst>
           </p:cNvPr>
@@ -3619,8 +3630,38 @@
         </p:blipFill>
         <p:spPr>
           <a:xfrm>
-            <a:off x="1030502" y="5154034"/>
-            <a:ext cx="9830355" cy="566837"/>
+            <a:off x="3862832" y="341781"/>
+            <a:ext cx="3912807" cy="3662048"/>
+          </a:xfrm>
+          <a:prstGeom prst="rect">
+            <a:avLst/>
+          </a:prstGeom>
+        </p:spPr>
+      </p:pic>
+      <p:pic>
+        <p:nvPicPr>
+          <p:cNvPr id="12" name="Kép 11">
+            <a:extLst>
+              <a:ext uri="{FF2B5EF4-FFF2-40B4-BE49-F238E27FC236}">
+                <a16:creationId xmlns:a16="http://schemas.microsoft.com/office/drawing/2014/main" id="{30C8D9FE-08BF-4597-BB1A-E5F455582CD3}"/>
+              </a:ext>
+            </a:extLst>
+          </p:cNvPr>
+          <p:cNvPicPr>
+            <a:picLocks noChangeAspect="1"/>
+          </p:cNvPicPr>
+          <p:nvPr/>
+        </p:nvPicPr>
+        <p:blipFill>
+          <a:blip r:embed="rId5"/>
+          <a:stretch>
+            <a:fillRect/>
+          </a:stretch>
+        </p:blipFill>
+        <p:spPr>
+          <a:xfrm>
+            <a:off x="417250" y="4876039"/>
+            <a:ext cx="11357499" cy="632436"/>
           </a:xfrm>
           <a:prstGeom prst="rect">
             <a:avLst/>
@@ -3631,6 +3672,880 @@
     <p:extLst>
       <p:ext uri="{BB962C8B-B14F-4D97-AF65-F5344CB8AC3E}">
         <p14:creationId xmlns:p14="http://schemas.microsoft.com/office/powerpoint/2010/main" val="2236455285"/>
+      </p:ext>
+    </p:extLst>
+  </p:cSld>
+  <p:clrMapOvr>
+    <a:masterClrMapping/>
+  </p:clrMapOvr>
+</p:sld>
+</file>
+
+<file path=ppt/slides/slide4.xml><?xml version="1.0" encoding="utf-8"?>
+<p:sld xmlns:a="http://schemas.openxmlformats.org/drawingml/2006/main" xmlns:r="http://schemas.openxmlformats.org/officeDocument/2006/relationships" xmlns:p="http://schemas.openxmlformats.org/presentationml/2006/main">
+  <p:cSld>
+    <p:spTree>
+      <p:nvGrpSpPr>
+        <p:cNvPr id="1" name=""/>
+        <p:cNvGrpSpPr/>
+        <p:nvPr/>
+      </p:nvGrpSpPr>
+      <p:grpSpPr>
+        <a:xfrm>
+          <a:off x="0" y="0"/>
+          <a:ext cx="0" cy="0"/>
+          <a:chOff x="0" y="0"/>
+          <a:chExt cx="0" cy="0"/>
+        </a:xfrm>
+      </p:grpSpPr>
+      <p:pic>
+        <p:nvPicPr>
+          <p:cNvPr id="5" name="Kép 4">
+            <a:extLst>
+              <a:ext uri="{FF2B5EF4-FFF2-40B4-BE49-F238E27FC236}">
+                <a16:creationId xmlns:a16="http://schemas.microsoft.com/office/drawing/2014/main" id="{6166AB69-2447-4F82-B897-0A84036EFDF7}"/>
+              </a:ext>
+            </a:extLst>
+          </p:cNvPr>
+          <p:cNvPicPr>
+            <a:picLocks noChangeAspect="1"/>
+          </p:cNvPicPr>
+          <p:nvPr/>
+        </p:nvPicPr>
+        <p:blipFill>
+          <a:blip r:embed="rId2"/>
+          <a:stretch>
+            <a:fillRect/>
+          </a:stretch>
+        </p:blipFill>
+        <p:spPr>
+          <a:xfrm>
+            <a:off x="1182013" y="257729"/>
+            <a:ext cx="4416546" cy="3114743"/>
+          </a:xfrm>
+          <a:prstGeom prst="rect">
+            <a:avLst/>
+          </a:prstGeom>
+        </p:spPr>
+      </p:pic>
+      <p:pic>
+        <p:nvPicPr>
+          <p:cNvPr id="7" name="Kép 6">
+            <a:extLst>
+              <a:ext uri="{FF2B5EF4-FFF2-40B4-BE49-F238E27FC236}">
+                <a16:creationId xmlns:a16="http://schemas.microsoft.com/office/drawing/2014/main" id="{BB668268-FF2B-4DF9-BE42-17A3E305B95D}"/>
+              </a:ext>
+            </a:extLst>
+          </p:cNvPr>
+          <p:cNvPicPr>
+            <a:picLocks noChangeAspect="1"/>
+          </p:cNvPicPr>
+          <p:nvPr/>
+        </p:nvPicPr>
+        <p:blipFill>
+          <a:blip r:embed="rId3"/>
+          <a:stretch>
+            <a:fillRect/>
+          </a:stretch>
+        </p:blipFill>
+        <p:spPr>
+          <a:xfrm>
+            <a:off x="6095999" y="257730"/>
+            <a:ext cx="4478451" cy="3114742"/>
+          </a:xfrm>
+          <a:prstGeom prst="rect">
+            <a:avLst/>
+          </a:prstGeom>
+        </p:spPr>
+      </p:pic>
+      <p:pic>
+        <p:nvPicPr>
+          <p:cNvPr id="9" name="Kép 8">
+            <a:extLst>
+              <a:ext uri="{FF2B5EF4-FFF2-40B4-BE49-F238E27FC236}">
+                <a16:creationId xmlns:a16="http://schemas.microsoft.com/office/drawing/2014/main" id="{04B2DCB7-D611-47AC-933B-CA457A7F082D}"/>
+              </a:ext>
+            </a:extLst>
+          </p:cNvPr>
+          <p:cNvPicPr>
+            <a:picLocks noChangeAspect="1"/>
+          </p:cNvPicPr>
+          <p:nvPr/>
+        </p:nvPicPr>
+        <p:blipFill>
+          <a:blip r:embed="rId4"/>
+          <a:stretch>
+            <a:fillRect/>
+          </a:stretch>
+        </p:blipFill>
+        <p:spPr>
+          <a:xfrm>
+            <a:off x="1190655" y="3618043"/>
+            <a:ext cx="4431284" cy="3114743"/>
+          </a:xfrm>
+          <a:prstGeom prst="rect">
+            <a:avLst/>
+          </a:prstGeom>
+        </p:spPr>
+      </p:pic>
+      <p:pic>
+        <p:nvPicPr>
+          <p:cNvPr id="11" name="Kép 10">
+            <a:extLst>
+              <a:ext uri="{FF2B5EF4-FFF2-40B4-BE49-F238E27FC236}">
+                <a16:creationId xmlns:a16="http://schemas.microsoft.com/office/drawing/2014/main" id="{268F3483-A948-4A81-8D95-C5A2F2EB69F2}"/>
+              </a:ext>
+            </a:extLst>
+          </p:cNvPr>
+          <p:cNvPicPr>
+            <a:picLocks noChangeAspect="1"/>
+          </p:cNvPicPr>
+          <p:nvPr/>
+        </p:nvPicPr>
+        <p:blipFill>
+          <a:blip r:embed="rId5"/>
+          <a:stretch>
+            <a:fillRect/>
+          </a:stretch>
+        </p:blipFill>
+        <p:spPr>
+          <a:xfrm>
+            <a:off x="6096000" y="3576777"/>
+            <a:ext cx="4478450" cy="3156009"/>
+          </a:xfrm>
+          <a:prstGeom prst="rect">
+            <a:avLst/>
+          </a:prstGeom>
+        </p:spPr>
+      </p:pic>
+    </p:spTree>
+    <p:extLst>
+      <p:ext uri="{BB962C8B-B14F-4D97-AF65-F5344CB8AC3E}">
+        <p14:creationId xmlns:p14="http://schemas.microsoft.com/office/powerpoint/2010/main" val="1529812838"/>
+      </p:ext>
+    </p:extLst>
+  </p:cSld>
+  <p:clrMapOvr>
+    <a:masterClrMapping/>
+  </p:clrMapOvr>
+</p:sld>
+</file>
+
+<file path=ppt/slides/slide5.xml><?xml version="1.0" encoding="utf-8"?>
+<p:sld xmlns:a="http://schemas.openxmlformats.org/drawingml/2006/main" xmlns:r="http://schemas.openxmlformats.org/officeDocument/2006/relationships" xmlns:p="http://schemas.openxmlformats.org/presentationml/2006/main">
+  <p:cSld>
+    <p:spTree>
+      <p:nvGrpSpPr>
+        <p:cNvPr id="1" name=""/>
+        <p:cNvGrpSpPr/>
+        <p:nvPr/>
+      </p:nvGrpSpPr>
+      <p:grpSpPr>
+        <a:xfrm>
+          <a:off x="0" y="0"/>
+          <a:ext cx="0" cy="0"/>
+          <a:chOff x="0" y="0"/>
+          <a:chExt cx="0" cy="0"/>
+        </a:xfrm>
+      </p:grpSpPr>
+      <p:sp>
+        <p:nvSpPr>
+          <p:cNvPr id="2" name="Cím 1">
+            <a:extLst>
+              <a:ext uri="{FF2B5EF4-FFF2-40B4-BE49-F238E27FC236}">
+                <a16:creationId xmlns:a16="http://schemas.microsoft.com/office/drawing/2014/main" id="{0EDAB8DC-086F-42BE-B0A9-1C338A23C293}"/>
+              </a:ext>
+            </a:extLst>
+          </p:cNvPr>
+          <p:cNvSpPr>
+            <a:spLocks noGrp="1"/>
+          </p:cNvSpPr>
+          <p:nvPr>
+            <p:ph type="title"/>
+          </p:nvPr>
+        </p:nvSpPr>
+        <p:spPr/>
+        <p:txBody>
+          <a:bodyPr/>
+          <a:lstStyle/>
+          <a:p>
+            <a:r>
+              <a:rPr lang="hu-HU"/>
+              <a:t>3. Szimuláció összeállítása</a:t>
+            </a:r>
+            <a:endParaRPr lang="en-US"/>
+          </a:p>
+        </p:txBody>
+      </p:sp>
+      <p:pic>
+        <p:nvPicPr>
+          <p:cNvPr id="5" name="Kép 4">
+            <a:extLst>
+              <a:ext uri="{FF2B5EF4-FFF2-40B4-BE49-F238E27FC236}">
+                <a16:creationId xmlns:a16="http://schemas.microsoft.com/office/drawing/2014/main" id="{190C93DF-8B08-4BD0-B698-710D5EC246D2}"/>
+              </a:ext>
+            </a:extLst>
+          </p:cNvPr>
+          <p:cNvPicPr>
+            <a:picLocks noChangeAspect="1"/>
+          </p:cNvPicPr>
+          <p:nvPr/>
+        </p:nvPicPr>
+        <p:blipFill>
+          <a:blip r:embed="rId2"/>
+          <a:stretch>
+            <a:fillRect/>
+          </a:stretch>
+        </p:blipFill>
+        <p:spPr>
+          <a:xfrm>
+            <a:off x="1606858" y="1394598"/>
+            <a:ext cx="8314966" cy="5098277"/>
+          </a:xfrm>
+          <a:prstGeom prst="rect">
+            <a:avLst/>
+          </a:prstGeom>
+        </p:spPr>
+      </p:pic>
+    </p:spTree>
+    <p:extLst>
+      <p:ext uri="{BB962C8B-B14F-4D97-AF65-F5344CB8AC3E}">
+        <p14:creationId xmlns:p14="http://schemas.microsoft.com/office/powerpoint/2010/main" val="4237327984"/>
+      </p:ext>
+    </p:extLst>
+  </p:cSld>
+  <p:clrMapOvr>
+    <a:masterClrMapping/>
+  </p:clrMapOvr>
+</p:sld>
+</file>
+
+<file path=ppt/slides/slide6.xml><?xml version="1.0" encoding="utf-8"?>
+<p:sld xmlns:a="http://schemas.openxmlformats.org/drawingml/2006/main" xmlns:r="http://schemas.openxmlformats.org/officeDocument/2006/relationships" xmlns:p="http://schemas.openxmlformats.org/presentationml/2006/main">
+  <p:cSld>
+    <p:spTree>
+      <p:nvGrpSpPr>
+        <p:cNvPr id="1" name=""/>
+        <p:cNvGrpSpPr/>
+        <p:nvPr/>
+      </p:nvGrpSpPr>
+      <p:grpSpPr>
+        <a:xfrm>
+          <a:off x="0" y="0"/>
+          <a:ext cx="0" cy="0"/>
+          <a:chOff x="0" y="0"/>
+          <a:chExt cx="0" cy="0"/>
+        </a:xfrm>
+      </p:grpSpPr>
+      <p:sp>
+        <p:nvSpPr>
+          <p:cNvPr id="2" name="Cím 1">
+            <a:extLst>
+              <a:ext uri="{FF2B5EF4-FFF2-40B4-BE49-F238E27FC236}">
+                <a16:creationId xmlns:a16="http://schemas.microsoft.com/office/drawing/2014/main" id="{575E0879-0B91-4CED-BDD7-B488564EF1BB}"/>
+              </a:ext>
+            </a:extLst>
+          </p:cNvPr>
+          <p:cNvSpPr>
+            <a:spLocks noGrp="1"/>
+          </p:cNvSpPr>
+          <p:nvPr>
+            <p:ph type="title"/>
+          </p:nvPr>
+        </p:nvSpPr>
+        <p:spPr/>
+        <p:txBody>
+          <a:bodyPr/>
+          <a:lstStyle/>
+          <a:p>
+            <a:r>
+              <a:rPr lang="hu-HU"/>
+              <a:t>Kábelezés</a:t>
+            </a:r>
+            <a:endParaRPr lang="en-US"/>
+          </a:p>
+        </p:txBody>
+      </p:sp>
+      <p:sp>
+        <p:nvSpPr>
+          <p:cNvPr id="3" name="Tartalom helye 2">
+            <a:extLst>
+              <a:ext uri="{FF2B5EF4-FFF2-40B4-BE49-F238E27FC236}">
+                <a16:creationId xmlns:a16="http://schemas.microsoft.com/office/drawing/2014/main" id="{0194E1C9-A24B-47A7-94C6-7769971B13BD}"/>
+              </a:ext>
+            </a:extLst>
+          </p:cNvPr>
+          <p:cNvSpPr>
+            <a:spLocks noGrp="1"/>
+          </p:cNvSpPr>
+          <p:nvPr>
+            <p:ph idx="1"/>
+          </p:nvPr>
+        </p:nvSpPr>
+        <p:spPr>
+          <a:xfrm>
+            <a:off x="838200" y="1825625"/>
+            <a:ext cx="10515600" cy="3216892"/>
+          </a:xfrm>
+        </p:spPr>
+        <p:txBody>
+          <a:bodyPr/>
+          <a:lstStyle/>
+          <a:p>
+            <a:r>
+              <a:rPr lang="en-US">
+                <a:effectLst/>
+                <a:latin typeface="Arial" panose="020B0604020202020204" pitchFamily="34" charset="0"/>
+                <a:cs typeface="Arial" panose="020B0604020202020204" pitchFamily="34" charset="0"/>
+              </a:rPr>
+              <a:t>R-SZEGED, R-KUBEKHAZA R-UJSZENTIVAN és R</a:t>
+            </a:r>
+            <a:r>
+              <a:rPr lang="hu-HU">
+                <a:latin typeface="Arial" panose="020B0604020202020204" pitchFamily="34" charset="0"/>
+                <a:cs typeface="Arial" panose="020B0604020202020204" pitchFamily="34" charset="0"/>
+              </a:rPr>
+              <a:t>-</a:t>
+            </a:r>
+            <a:r>
+              <a:rPr lang="en-US">
+                <a:effectLst/>
+                <a:latin typeface="Arial" panose="020B0604020202020204" pitchFamily="34" charset="0"/>
+                <a:cs typeface="Arial" panose="020B0604020202020204" pitchFamily="34" charset="0"/>
+              </a:rPr>
+              <a:t>TISZASZIGET routerek közötti</a:t>
+            </a:r>
+            <a:r>
+              <a:rPr lang="hu-HU">
+                <a:effectLst/>
+                <a:latin typeface="Arial" panose="020B0604020202020204" pitchFamily="34" charset="0"/>
+                <a:cs typeface="Arial" panose="020B0604020202020204" pitchFamily="34" charset="0"/>
+              </a:rPr>
+              <a:t> </a:t>
+            </a:r>
+            <a:r>
+              <a:rPr lang="en-US">
+                <a:effectLst/>
+                <a:latin typeface="Arial" panose="020B0604020202020204" pitchFamily="34" charset="0"/>
+                <a:cs typeface="Arial" panose="020B0604020202020204" pitchFamily="34" charset="0"/>
+              </a:rPr>
+              <a:t>hálózatok</a:t>
+            </a:r>
+            <a:r>
+              <a:rPr lang="hu-HU">
+                <a:effectLst/>
+                <a:latin typeface="Arial" panose="020B0604020202020204" pitchFamily="34" charset="0"/>
+                <a:cs typeface="Arial" panose="020B0604020202020204" pitchFamily="34" charset="0"/>
+              </a:rPr>
+              <a:t>hoz</a:t>
+            </a:r>
+            <a:r>
+              <a:rPr lang="en-US">
+                <a:effectLst/>
+                <a:latin typeface="Arial" panose="020B0604020202020204" pitchFamily="34" charset="0"/>
+                <a:cs typeface="Arial" panose="020B0604020202020204" pitchFamily="34" charset="0"/>
+              </a:rPr>
+              <a:t> optikai vezetéket</a:t>
+            </a:r>
+            <a:r>
+              <a:rPr lang="hu-HU">
+                <a:effectLst/>
+                <a:latin typeface="Arial" panose="020B0604020202020204" pitchFamily="34" charset="0"/>
+                <a:cs typeface="Arial" panose="020B0604020202020204" pitchFamily="34" charset="0"/>
+              </a:rPr>
+              <a:t> használtuk.</a:t>
+            </a:r>
+          </a:p>
+          <a:p>
+            <a:r>
+              <a:rPr lang="hu-HU">
+                <a:latin typeface="Arial" panose="020B0604020202020204" pitchFamily="34" charset="0"/>
+                <a:cs typeface="Arial" panose="020B0604020202020204" pitchFamily="34" charset="0"/>
+              </a:rPr>
+              <a:t>Néhány (2: R-KUBEKHAZA, KUBEK-Wifi-5G) router esetében crossover kábelt használtunk</a:t>
+            </a:r>
+            <a:endParaRPr lang="hu-HU">
+              <a:effectLst/>
+              <a:latin typeface="Arial" panose="020B0604020202020204" pitchFamily="34" charset="0"/>
+              <a:cs typeface="Arial" panose="020B0604020202020204" pitchFamily="34" charset="0"/>
+            </a:endParaRPr>
+          </a:p>
+          <a:p>
+            <a:r>
+              <a:rPr lang="hu-HU">
+                <a:latin typeface="Arial" panose="020B0604020202020204" pitchFamily="34" charset="0"/>
+                <a:cs typeface="Arial" panose="020B0604020202020204" pitchFamily="34" charset="0"/>
+              </a:rPr>
+              <a:t>A switchek és az eszközök között egyenes kötésű kábeleket használtunk</a:t>
+            </a:r>
+          </a:p>
+          <a:p>
+            <a:endParaRPr lang="en-US">
+              <a:latin typeface="Arial" panose="020B0604020202020204" pitchFamily="34" charset="0"/>
+              <a:cs typeface="Arial" panose="020B0604020202020204" pitchFamily="34" charset="0"/>
+            </a:endParaRPr>
+          </a:p>
+        </p:txBody>
+      </p:sp>
+    </p:spTree>
+    <p:extLst>
+      <p:ext uri="{BB962C8B-B14F-4D97-AF65-F5344CB8AC3E}">
+        <p14:creationId xmlns:p14="http://schemas.microsoft.com/office/powerpoint/2010/main" val="3582099393"/>
+      </p:ext>
+    </p:extLst>
+  </p:cSld>
+  <p:clrMapOvr>
+    <a:masterClrMapping/>
+  </p:clrMapOvr>
+</p:sld>
+</file>
+
+<file path=ppt/slides/slide7.xml><?xml version="1.0" encoding="utf-8"?>
+<p:sld xmlns:a="http://schemas.openxmlformats.org/drawingml/2006/main" xmlns:r="http://schemas.openxmlformats.org/officeDocument/2006/relationships" xmlns:p="http://schemas.openxmlformats.org/presentationml/2006/main">
+  <p:cSld>
+    <p:spTree>
+      <p:nvGrpSpPr>
+        <p:cNvPr id="1" name=""/>
+        <p:cNvGrpSpPr/>
+        <p:nvPr/>
+      </p:nvGrpSpPr>
+      <p:grpSpPr>
+        <a:xfrm>
+          <a:off x="0" y="0"/>
+          <a:ext cx="0" cy="0"/>
+          <a:chOff x="0" y="0"/>
+          <a:chExt cx="0" cy="0"/>
+        </a:xfrm>
+      </p:grpSpPr>
+      <p:sp>
+        <p:nvSpPr>
+          <p:cNvPr id="2" name="Cím 1">
+            <a:extLst>
+              <a:ext uri="{FF2B5EF4-FFF2-40B4-BE49-F238E27FC236}">
+                <a16:creationId xmlns:a16="http://schemas.microsoft.com/office/drawing/2014/main" id="{03201482-43E3-4033-93EC-CFB0FC1A5281}"/>
+              </a:ext>
+            </a:extLst>
+          </p:cNvPr>
+          <p:cNvSpPr>
+            <a:spLocks noGrp="1"/>
+          </p:cNvSpPr>
+          <p:nvPr>
+            <p:ph type="title"/>
+          </p:nvPr>
+        </p:nvSpPr>
+        <p:spPr/>
+        <p:txBody>
+          <a:bodyPr/>
+          <a:lstStyle/>
+          <a:p>
+            <a:r>
+              <a:rPr lang="hu-HU"/>
+              <a:t>Különböző routerek felépítése</a:t>
+            </a:r>
+            <a:endParaRPr lang="en-US"/>
+          </a:p>
+        </p:txBody>
+      </p:sp>
+      <p:pic>
+        <p:nvPicPr>
+          <p:cNvPr id="5" name="Kép 4">
+            <a:extLst>
+              <a:ext uri="{FF2B5EF4-FFF2-40B4-BE49-F238E27FC236}">
+                <a16:creationId xmlns:a16="http://schemas.microsoft.com/office/drawing/2014/main" id="{76CCB46E-BA63-40B5-8D1D-B2B5E7F68AC2}"/>
+              </a:ext>
+            </a:extLst>
+          </p:cNvPr>
+          <p:cNvPicPr>
+            <a:picLocks noChangeAspect="1"/>
+          </p:cNvPicPr>
+          <p:nvPr/>
+        </p:nvPicPr>
+        <p:blipFill>
+          <a:blip r:embed="rId2"/>
+          <a:stretch>
+            <a:fillRect/>
+          </a:stretch>
+        </p:blipFill>
+        <p:spPr>
+          <a:xfrm>
+            <a:off x="1512718" y="1521595"/>
+            <a:ext cx="8953500" cy="1790700"/>
+          </a:xfrm>
+          <a:prstGeom prst="rect">
+            <a:avLst/>
+          </a:prstGeom>
+        </p:spPr>
+      </p:pic>
+      <p:pic>
+        <p:nvPicPr>
+          <p:cNvPr id="7" name="Kép 6">
+            <a:extLst>
+              <a:ext uri="{FF2B5EF4-FFF2-40B4-BE49-F238E27FC236}">
+                <a16:creationId xmlns:a16="http://schemas.microsoft.com/office/drawing/2014/main" id="{A7C25B79-6245-4103-8E76-324585734C19}"/>
+              </a:ext>
+            </a:extLst>
+          </p:cNvPr>
+          <p:cNvPicPr>
+            <a:picLocks noChangeAspect="1"/>
+          </p:cNvPicPr>
+          <p:nvPr/>
+        </p:nvPicPr>
+        <p:blipFill>
+          <a:blip r:embed="rId3"/>
+          <a:stretch>
+            <a:fillRect/>
+          </a:stretch>
+        </p:blipFill>
+        <p:spPr>
+          <a:xfrm>
+            <a:off x="1521041" y="3429000"/>
+            <a:ext cx="8945177" cy="1731938"/>
+          </a:xfrm>
+          <a:prstGeom prst="rect">
+            <a:avLst/>
+          </a:prstGeom>
+        </p:spPr>
+      </p:pic>
+      <p:sp>
+        <p:nvSpPr>
+          <p:cNvPr id="8" name="Szövegdoboz 7">
+            <a:extLst>
+              <a:ext uri="{FF2B5EF4-FFF2-40B4-BE49-F238E27FC236}">
+                <a16:creationId xmlns:a16="http://schemas.microsoft.com/office/drawing/2014/main" id="{F49CF815-C683-4331-83E3-B597A55E8C11}"/>
+              </a:ext>
+            </a:extLst>
+          </p:cNvPr>
+          <p:cNvSpPr txBox="1"/>
+          <p:nvPr/>
+        </p:nvSpPr>
+        <p:spPr>
+          <a:xfrm>
+            <a:off x="1366567" y="5672830"/>
+            <a:ext cx="9245801" cy="400110"/>
+          </a:xfrm>
+          <a:prstGeom prst="rect">
+            <a:avLst/>
+          </a:prstGeom>
+          <a:noFill/>
+        </p:spPr>
+        <p:txBody>
+          <a:bodyPr wrap="none" rtlCol="0">
+            <a:spAutoFit/>
+          </a:bodyPr>
+          <a:lstStyle/>
+          <a:p>
+            <a:r>
+              <a:rPr lang="hu-HU" sz="2000"/>
+              <a:t>PT-ROUTER-NM-1CGE, PT-ROUTER-NM-1FGE és PT-ROUTER-NM-1S modulok használva</a:t>
+            </a:r>
+            <a:endParaRPr lang="en-US" sz="2000"/>
+          </a:p>
+        </p:txBody>
+      </p:sp>
+    </p:spTree>
+    <p:extLst>
+      <p:ext uri="{BB962C8B-B14F-4D97-AF65-F5344CB8AC3E}">
+        <p14:creationId xmlns:p14="http://schemas.microsoft.com/office/powerpoint/2010/main" val="3069795580"/>
+      </p:ext>
+    </p:extLst>
+  </p:cSld>
+  <p:clrMapOvr>
+    <a:masterClrMapping/>
+  </p:clrMapOvr>
+</p:sld>
+</file>
+
+<file path=ppt/slides/slide8.xml><?xml version="1.0" encoding="utf-8"?>
+<p:sld xmlns:a="http://schemas.openxmlformats.org/drawingml/2006/main" xmlns:r="http://schemas.openxmlformats.org/officeDocument/2006/relationships" xmlns:p="http://schemas.openxmlformats.org/presentationml/2006/main">
+  <p:cSld>
+    <p:spTree>
+      <p:nvGrpSpPr>
+        <p:cNvPr id="1" name=""/>
+        <p:cNvGrpSpPr/>
+        <p:nvPr/>
+      </p:nvGrpSpPr>
+      <p:grpSpPr>
+        <a:xfrm>
+          <a:off x="0" y="0"/>
+          <a:ext cx="0" cy="0"/>
+          <a:chOff x="0" y="0"/>
+          <a:chExt cx="0" cy="0"/>
+        </a:xfrm>
+      </p:grpSpPr>
+      <p:sp>
+        <p:nvSpPr>
+          <p:cNvPr id="2" name="Cím 1">
+            <a:extLst>
+              <a:ext uri="{FF2B5EF4-FFF2-40B4-BE49-F238E27FC236}">
+                <a16:creationId xmlns:a16="http://schemas.microsoft.com/office/drawing/2014/main" id="{210AF485-4AB8-448A-81C2-FE53D703D288}"/>
+              </a:ext>
+            </a:extLst>
+          </p:cNvPr>
+          <p:cNvSpPr>
+            <a:spLocks noGrp="1"/>
+          </p:cNvSpPr>
+          <p:nvPr>
+            <p:ph type="title"/>
+          </p:nvPr>
+        </p:nvSpPr>
+        <p:spPr/>
+        <p:txBody>
+          <a:bodyPr/>
+          <a:lstStyle/>
+          <a:p>
+            <a:r>
+              <a:rPr lang="hu-HU"/>
+              <a:t>Switchek felépítése</a:t>
+            </a:r>
+            <a:endParaRPr lang="en-US"/>
+          </a:p>
+        </p:txBody>
+      </p:sp>
+      <p:pic>
+        <p:nvPicPr>
+          <p:cNvPr id="5" name="Kép 4">
+            <a:extLst>
+              <a:ext uri="{FF2B5EF4-FFF2-40B4-BE49-F238E27FC236}">
+                <a16:creationId xmlns:a16="http://schemas.microsoft.com/office/drawing/2014/main" id="{CE138036-2AAB-4F48-B5F0-6C5425E13010}"/>
+              </a:ext>
+            </a:extLst>
+          </p:cNvPr>
+          <p:cNvPicPr>
+            <a:picLocks noChangeAspect="1"/>
+          </p:cNvPicPr>
+          <p:nvPr/>
+        </p:nvPicPr>
+        <p:blipFill>
+          <a:blip r:embed="rId2"/>
+          <a:stretch>
+            <a:fillRect/>
+          </a:stretch>
+        </p:blipFill>
+        <p:spPr>
+          <a:xfrm>
+            <a:off x="838200" y="1690688"/>
+            <a:ext cx="10283930" cy="954858"/>
+          </a:xfrm>
+          <a:prstGeom prst="rect">
+            <a:avLst/>
+          </a:prstGeom>
+        </p:spPr>
+      </p:pic>
+      <p:sp>
+        <p:nvSpPr>
+          <p:cNvPr id="6" name="Szövegdoboz 5">
+            <a:extLst>
+              <a:ext uri="{FF2B5EF4-FFF2-40B4-BE49-F238E27FC236}">
+                <a16:creationId xmlns:a16="http://schemas.microsoft.com/office/drawing/2014/main" id="{3F2A3B4C-20DA-40EB-9F23-B72A459E6657}"/>
+              </a:ext>
+            </a:extLst>
+          </p:cNvPr>
+          <p:cNvSpPr txBox="1"/>
+          <p:nvPr/>
+        </p:nvSpPr>
+        <p:spPr>
+          <a:xfrm>
+            <a:off x="2911568" y="3198167"/>
+            <a:ext cx="6137193" cy="461665"/>
+          </a:xfrm>
+          <a:prstGeom prst="rect">
+            <a:avLst/>
+          </a:prstGeom>
+          <a:noFill/>
+        </p:spPr>
+        <p:txBody>
+          <a:bodyPr wrap="none" rtlCol="0">
+            <a:spAutoFit/>
+          </a:bodyPr>
+          <a:lstStyle/>
+          <a:p>
+            <a:r>
+              <a:rPr lang="hu-HU" sz="2400"/>
+              <a:t>PT-SWITCH-NM-1CGE modul és cover használva</a:t>
+            </a:r>
+            <a:endParaRPr lang="en-US" sz="2400"/>
+          </a:p>
+        </p:txBody>
+      </p:sp>
+    </p:spTree>
+    <p:extLst>
+      <p:ext uri="{BB962C8B-B14F-4D97-AF65-F5344CB8AC3E}">
+        <p14:creationId xmlns:p14="http://schemas.microsoft.com/office/powerpoint/2010/main" val="632962958"/>
+      </p:ext>
+    </p:extLst>
+  </p:cSld>
+  <p:clrMapOvr>
+    <a:masterClrMapping/>
+  </p:clrMapOvr>
+</p:sld>
+</file>
+
+<file path=ppt/slides/slide9.xml><?xml version="1.0" encoding="utf-8"?>
+<p:sld xmlns:a="http://schemas.openxmlformats.org/drawingml/2006/main" xmlns:r="http://schemas.openxmlformats.org/officeDocument/2006/relationships" xmlns:p="http://schemas.openxmlformats.org/presentationml/2006/main">
+  <p:cSld>
+    <p:spTree>
+      <p:nvGrpSpPr>
+        <p:cNvPr id="1" name=""/>
+        <p:cNvGrpSpPr/>
+        <p:nvPr/>
+      </p:nvGrpSpPr>
+      <p:grpSpPr>
+        <a:xfrm>
+          <a:off x="0" y="0"/>
+          <a:ext cx="0" cy="0"/>
+          <a:chOff x="0" y="0"/>
+          <a:chExt cx="0" cy="0"/>
+        </a:xfrm>
+      </p:grpSpPr>
+      <p:sp>
+        <p:nvSpPr>
+          <p:cNvPr id="2" name="Cím 1">
+            <a:extLst>
+              <a:ext uri="{FF2B5EF4-FFF2-40B4-BE49-F238E27FC236}">
+                <a16:creationId xmlns:a16="http://schemas.microsoft.com/office/drawing/2014/main" id="{A27C16D2-38D1-4827-8394-A9A0B67438F9}"/>
+              </a:ext>
+            </a:extLst>
+          </p:cNvPr>
+          <p:cNvSpPr>
+            <a:spLocks noGrp="1"/>
+          </p:cNvSpPr>
+          <p:nvPr>
+            <p:ph type="title"/>
+          </p:nvPr>
+        </p:nvSpPr>
+        <p:spPr>
+          <a:xfrm>
+            <a:off x="3403476" y="348657"/>
+            <a:ext cx="5385047" cy="1325563"/>
+          </a:xfrm>
+        </p:spPr>
+        <p:txBody>
+          <a:bodyPr/>
+          <a:lstStyle/>
+          <a:p>
+            <a:r>
+              <a:rPr lang="hu-HU"/>
+              <a:t>Köszönjük a figyelmet!</a:t>
+            </a:r>
+            <a:endParaRPr lang="en-US"/>
+          </a:p>
+        </p:txBody>
+      </p:sp>
+      <p:pic>
+        <p:nvPicPr>
+          <p:cNvPr id="5" name="Kép 4">
+            <a:extLst>
+              <a:ext uri="{FF2B5EF4-FFF2-40B4-BE49-F238E27FC236}">
+                <a16:creationId xmlns:a16="http://schemas.microsoft.com/office/drawing/2014/main" id="{D0FC049C-828A-4558-A9CF-4E2BAED14905}"/>
+              </a:ext>
+            </a:extLst>
+          </p:cNvPr>
+          <p:cNvPicPr>
+            <a:picLocks noChangeAspect="1"/>
+          </p:cNvPicPr>
+          <p:nvPr/>
+        </p:nvPicPr>
+        <p:blipFill>
+          <a:blip r:embed="rId2">
+            <a:extLst>
+              <a:ext uri="{28A0092B-C50C-407E-A947-70E740481C1C}">
+                <a14:useLocalDpi xmlns:a14="http://schemas.microsoft.com/office/drawing/2010/main" val="0"/>
+              </a:ext>
+            </a:extLst>
+          </a:blip>
+          <a:stretch>
+            <a:fillRect/>
+          </a:stretch>
+        </p:blipFill>
+        <p:spPr>
+          <a:xfrm>
+            <a:off x="1596102" y="1674220"/>
+            <a:ext cx="3614747" cy="2809644"/>
+          </a:xfrm>
+          <a:prstGeom prst="rect">
+            <a:avLst/>
+          </a:prstGeom>
+        </p:spPr>
+      </p:pic>
+      <p:pic>
+        <p:nvPicPr>
+          <p:cNvPr id="7" name="Kép 6">
+            <a:extLst>
+              <a:ext uri="{FF2B5EF4-FFF2-40B4-BE49-F238E27FC236}">
+                <a16:creationId xmlns:a16="http://schemas.microsoft.com/office/drawing/2014/main" id="{CD256E76-E604-4146-AF33-EE1690471190}"/>
+              </a:ext>
+            </a:extLst>
+          </p:cNvPr>
+          <p:cNvPicPr>
+            <a:picLocks noChangeAspect="1"/>
+          </p:cNvPicPr>
+          <p:nvPr/>
+        </p:nvPicPr>
+        <p:blipFill>
+          <a:blip r:embed="rId3">
+            <a:extLst>
+              <a:ext uri="{28A0092B-C50C-407E-A947-70E740481C1C}">
+                <a14:useLocalDpi xmlns:a14="http://schemas.microsoft.com/office/drawing/2010/main" val="0"/>
+              </a:ext>
+            </a:extLst>
+          </a:blip>
+          <a:stretch>
+            <a:fillRect/>
+          </a:stretch>
+        </p:blipFill>
+        <p:spPr>
+          <a:xfrm>
+            <a:off x="7274880" y="1788341"/>
+            <a:ext cx="3027285" cy="3027285"/>
+          </a:xfrm>
+          <a:prstGeom prst="rect">
+            <a:avLst/>
+          </a:prstGeom>
+        </p:spPr>
+      </p:pic>
+      <p:sp>
+        <p:nvSpPr>
+          <p:cNvPr id="10" name="Szövegdoboz 9">
+            <a:extLst>
+              <a:ext uri="{FF2B5EF4-FFF2-40B4-BE49-F238E27FC236}">
+                <a16:creationId xmlns:a16="http://schemas.microsoft.com/office/drawing/2014/main" id="{07F9335E-D9A9-4921-ADF9-FC44BA4FE52E}"/>
+              </a:ext>
+            </a:extLst>
+          </p:cNvPr>
+          <p:cNvSpPr txBox="1"/>
+          <p:nvPr/>
+        </p:nvSpPr>
+        <p:spPr>
+          <a:xfrm>
+            <a:off x="3623568" y="5344807"/>
+            <a:ext cx="4944862" cy="769441"/>
+          </a:xfrm>
+          <a:prstGeom prst="rect">
+            <a:avLst/>
+          </a:prstGeom>
+          <a:noFill/>
+        </p:spPr>
+        <p:txBody>
+          <a:bodyPr wrap="square" rtlCol="0">
+            <a:spAutoFit/>
+          </a:bodyPr>
+          <a:lstStyle/>
+          <a:p>
+            <a:r>
+              <a:rPr lang="en-US" sz="4400" b="0" i="0">
+                <a:effectLst/>
+                <a:latin typeface="Whitney"/>
+              </a:rPr>
+              <a:t>shorturl.at/kmFG6</a:t>
+            </a:r>
+            <a:endParaRPr lang="en-US" sz="4400"/>
+          </a:p>
+        </p:txBody>
+      </p:sp>
+    </p:spTree>
+    <p:extLst>
+      <p:ext uri="{BB962C8B-B14F-4D97-AF65-F5344CB8AC3E}">
+        <p14:creationId xmlns:p14="http://schemas.microsoft.com/office/powerpoint/2010/main" val="134212532"/>
       </p:ext>
     </p:extLst>
   </p:cSld>

</xml_diff>